<commit_message>
Az Conf Work Shop
</commit_message>
<xml_diff>
--- a/CSharpCorner/16Oct2020_FullStack/Documentation/WebAPI_gRPCWeb_Blazor_WASM_.NetCore_3.1_EFCore_SQL_Redis_Angular.pptx
+++ b/CSharpCorner/16Oct2020_FullStack/Documentation/WebAPI_gRPCWeb_Blazor_WASM_.NetCore_3.1_EFCore_SQL_Redis_Angular.pptx
@@ -232,7 +232,7 @@
           <a:p>
             <a:fld id="{289D7669-2C4F-4057-B198-13E596C98571}" type="datetimeFigureOut">
               <a:rPr lang="en-IN" smtClean="0"/>
-              <a:t>16-10-2020</a:t>
+              <a:t>26-11-2020</a:t>
             </a:fld>
             <a:endParaRPr lang="en-IN"/>
           </a:p>
@@ -649,7 +649,7 @@
           <a:p>
             <a:fld id="{AAAFDAC1-E73E-4D41-B9D9-D9AB5226AECC}" type="datetimeFigureOut">
               <a:rPr lang="en-IN" smtClean="0"/>
-              <a:t>16-10-2020</a:t>
+              <a:t>26-11-2020</a:t>
             </a:fld>
             <a:endParaRPr lang="en-IN"/>
           </a:p>
@@ -849,7 +849,7 @@
           <a:p>
             <a:fld id="{AAAFDAC1-E73E-4D41-B9D9-D9AB5226AECC}" type="datetimeFigureOut">
               <a:rPr lang="en-IN" smtClean="0"/>
-              <a:t>16-10-2020</a:t>
+              <a:t>26-11-2020</a:t>
             </a:fld>
             <a:endParaRPr lang="en-IN"/>
           </a:p>
@@ -1059,7 +1059,7 @@
           <a:p>
             <a:fld id="{AAAFDAC1-E73E-4D41-B9D9-D9AB5226AECC}" type="datetimeFigureOut">
               <a:rPr lang="en-IN" smtClean="0"/>
-              <a:t>16-10-2020</a:t>
+              <a:t>26-11-2020</a:t>
             </a:fld>
             <a:endParaRPr lang="en-IN"/>
           </a:p>
@@ -1259,7 +1259,7 @@
           <a:p>
             <a:fld id="{AAAFDAC1-E73E-4D41-B9D9-D9AB5226AECC}" type="datetimeFigureOut">
               <a:rPr lang="en-IN" smtClean="0"/>
-              <a:t>16-10-2020</a:t>
+              <a:t>26-11-2020</a:t>
             </a:fld>
             <a:endParaRPr lang="en-IN"/>
           </a:p>
@@ -1535,7 +1535,7 @@
           <a:p>
             <a:fld id="{AAAFDAC1-E73E-4D41-B9D9-D9AB5226AECC}" type="datetimeFigureOut">
               <a:rPr lang="en-IN" smtClean="0"/>
-              <a:t>16-10-2020</a:t>
+              <a:t>26-11-2020</a:t>
             </a:fld>
             <a:endParaRPr lang="en-IN"/>
           </a:p>
@@ -1803,7 +1803,7 @@
           <a:p>
             <a:fld id="{AAAFDAC1-E73E-4D41-B9D9-D9AB5226AECC}" type="datetimeFigureOut">
               <a:rPr lang="en-IN" smtClean="0"/>
-              <a:t>16-10-2020</a:t>
+              <a:t>26-11-2020</a:t>
             </a:fld>
             <a:endParaRPr lang="en-IN"/>
           </a:p>
@@ -2218,7 +2218,7 @@
           <a:p>
             <a:fld id="{AAAFDAC1-E73E-4D41-B9D9-D9AB5226AECC}" type="datetimeFigureOut">
               <a:rPr lang="en-IN" smtClean="0"/>
-              <a:t>16-10-2020</a:t>
+              <a:t>26-11-2020</a:t>
             </a:fld>
             <a:endParaRPr lang="en-IN"/>
           </a:p>
@@ -2360,7 +2360,7 @@
           <a:p>
             <a:fld id="{AAAFDAC1-E73E-4D41-B9D9-D9AB5226AECC}" type="datetimeFigureOut">
               <a:rPr lang="en-IN" smtClean="0"/>
-              <a:t>16-10-2020</a:t>
+              <a:t>26-11-2020</a:t>
             </a:fld>
             <a:endParaRPr lang="en-IN"/>
           </a:p>
@@ -2473,7 +2473,7 @@
           <a:p>
             <a:fld id="{AAAFDAC1-E73E-4D41-B9D9-D9AB5226AECC}" type="datetimeFigureOut">
               <a:rPr lang="en-IN" smtClean="0"/>
-              <a:t>16-10-2020</a:t>
+              <a:t>26-11-2020</a:t>
             </a:fld>
             <a:endParaRPr lang="en-IN"/>
           </a:p>
@@ -2786,7 +2786,7 @@
           <a:p>
             <a:fld id="{AAAFDAC1-E73E-4D41-B9D9-D9AB5226AECC}" type="datetimeFigureOut">
               <a:rPr lang="en-IN" smtClean="0"/>
-              <a:t>16-10-2020</a:t>
+              <a:t>26-11-2020</a:t>
             </a:fld>
             <a:endParaRPr lang="en-IN"/>
           </a:p>
@@ -3075,7 +3075,7 @@
           <a:p>
             <a:fld id="{AAAFDAC1-E73E-4D41-B9D9-D9AB5226AECC}" type="datetimeFigureOut">
               <a:rPr lang="en-IN" smtClean="0"/>
-              <a:t>16-10-2020</a:t>
+              <a:t>26-11-2020</a:t>
             </a:fld>
             <a:endParaRPr lang="en-IN"/>
           </a:p>
@@ -3318,7 +3318,7 @@
           <a:p>
             <a:fld id="{AAAFDAC1-E73E-4D41-B9D9-D9AB5226AECC}" type="datetimeFigureOut">
               <a:rPr lang="en-IN" smtClean="0"/>
-              <a:t>16-10-2020</a:t>
+              <a:t>26-11-2020</a:t>
             </a:fld>
             <a:endParaRPr lang="en-IN"/>
           </a:p>
@@ -12840,7 +12840,7 @@
                 <a:latin typeface="Verdana" panose="020B0604030504040204" pitchFamily="34" charset="0"/>
                 <a:ea typeface="Verdana" panose="020B0604030504040204" pitchFamily="34" charset="0"/>
               </a:rPr>
-              <a:t>16-Oct-2020</a:t>
+              <a:t>26-Nov-2020</a:t>
             </a:r>
           </a:p>
         </p:txBody>
@@ -13015,15 +13015,22 @@
           </a:lstStyle>
           <a:p>
             <a:r>
-              <a:rPr lang="en-IN" b="1" dirty="0">
+              <a:rPr lang="en-IN" b="1" dirty="0" err="1">
                 <a:solidFill>
                   <a:srgbClr val="002060"/>
                 </a:solidFill>
                 <a:latin typeface="Verdana" panose="020B0604030504040204" pitchFamily="34" charset="0"/>
                 <a:ea typeface="Verdana" panose="020B0604030504040204" pitchFamily="34" charset="0"/>
               </a:rPr>
-              <a:t>C# Corner</a:t>
-            </a:r>
+              <a:t>AzConf.dev</a:t>
+            </a:r>
+            <a:endParaRPr lang="en-IN" b="1" dirty="0">
+              <a:solidFill>
+                <a:srgbClr val="002060"/>
+              </a:solidFill>
+              <a:latin typeface="Verdana" panose="020B0604030504040204" pitchFamily="34" charset="0"/>
+              <a:ea typeface="Verdana" panose="020B0604030504040204" pitchFamily="34" charset="0"/>
+            </a:endParaRPr>
           </a:p>
         </p:txBody>
       </p:sp>

</xml_diff>